<commit_message>
Reorganized onotlogies folder (move scr to archive folder)
</commit_message>
<xml_diff>
--- a/content/day 4/Day 4 - Practical.pptx
+++ b/content/day 4/Day 4 - Practical.pptx
@@ -1522,8 +1522,11 @@
           <a:p>
             <a:r>
               <a:rPr lang="en-US" dirty="0"/>
-              <a:t>FAIR implementation is all about increasing the value of your data!</a:t>
-            </a:r>
+              <a:t>RECAP day 2/3. The value of adding metadata to your data. </a:t>
+            </a:r>
+          </a:p>
+          <a:p>
+            <a:endParaRPr lang="en-US" dirty="0"/>
           </a:p>
         </p:txBody>
       </p:sp>
@@ -9306,6 +9309,22 @@
                 <a:effectLst/>
                 <a:latin typeface="Söhne"/>
               </a:rPr>
+              <a:t>Version control of </a:t>
+            </a:r>
+          </a:p>
+          <a:p>
+            <a:pPr algn="l">
+              <a:buFont typeface="+mj-lt"/>
+              <a:buAutoNum type="arabicPeriod"/>
+            </a:pPr>
+            <a:r>
+              <a:rPr lang="en-US" b="1" i="0" dirty="0">
+                <a:solidFill>
+                  <a:srgbClr val="374151"/>
+                </a:solidFill>
+                <a:effectLst/>
+                <a:latin typeface="Söhne"/>
+              </a:rPr>
               <a:t>Deploy Netflix to Bioportal</a:t>
             </a:r>
           </a:p>
@@ -9536,17 +9555,7 @@
                 <a:effectLst/>
                 <a:latin typeface="Söhne"/>
               </a:rPr>
-              <a:t>CEDAR is a technology to use </a:t>
-            </a:r>
-            <a:r>
-              <a:rPr lang="en-US" b="1" i="0">
-                <a:solidFill>
-                  <a:srgbClr val="374151"/>
-                </a:solidFill>
-                <a:effectLst/>
-                <a:latin typeface="Söhne"/>
-              </a:rPr>
-              <a:t>metadata standards</a:t>
+              <a:t>CEDAR is a technology to use metadata standards</a:t>
             </a:r>
             <a:endParaRPr lang="en-US" b="0" i="0" dirty="0">
               <a:solidFill>

</xml_diff>